<commit_message>
Documentation and ppt commit
</commit_message>
<xml_diff>
--- a/OPMS.pptx
+++ b/OPMS.pptx
@@ -8,13 +8,14 @@
     <p:sldId id="256" r:id="rId2"/>
     <p:sldId id="265" r:id="rId3"/>
     <p:sldId id="257" r:id="rId4"/>
-    <p:sldId id="258" r:id="rId5"/>
-    <p:sldId id="260" r:id="rId6"/>
-    <p:sldId id="261" r:id="rId7"/>
-    <p:sldId id="262" r:id="rId8"/>
-    <p:sldId id="263" r:id="rId9"/>
-    <p:sldId id="266" r:id="rId10"/>
+    <p:sldId id="268" r:id="rId5"/>
+    <p:sldId id="258" r:id="rId6"/>
+    <p:sldId id="260" r:id="rId7"/>
+    <p:sldId id="261" r:id="rId8"/>
+    <p:sldId id="262" r:id="rId9"/>
+    <p:sldId id="263" r:id="rId10"/>
     <p:sldId id="267" r:id="rId11"/>
+    <p:sldId id="266" r:id="rId12"/>
   </p:sldIdLst>
   <p:sldSz cx="12192000" cy="6858000"/>
   <p:notesSz cx="6858000" cy="9144000"/>
@@ -113,6 +114,11 @@
       </a:defRPr>
     </a:lvl9pPr>
   </p:defaultTextStyle>
+  <p:extLst>
+    <p:ext uri="{EFAFB233-063F-42B5-8137-9DF3F51BA10A}">
+      <p15:sldGuideLst xmlns:p15="http://schemas.microsoft.com/office/powerpoint/2012/main" xmlns=""/>
+    </p:ext>
+  </p:extLst>
 </p:presentation>
 </file>
 
@@ -838,7 +844,7 @@
           <a:p>
             <a:fld id="{4896C31C-43B8-41EE-BCE8-B34BD948A31C}" type="datetimeFigureOut">
               <a:rPr lang="en-IN" smtClean="0"/>
-              <a:t>12-05-2022</a:t>
+              <a:t>20-05-2022</a:t>
             </a:fld>
             <a:endParaRPr lang="en-IN"/>
           </a:p>
@@ -1089,7 +1095,7 @@
           <a:p>
             <a:fld id="{4896C31C-43B8-41EE-BCE8-B34BD948A31C}" type="datetimeFigureOut">
               <a:rPr lang="en-IN" smtClean="0"/>
-              <a:t>12-05-2022</a:t>
+              <a:t>20-05-2022</a:t>
             </a:fld>
             <a:endParaRPr lang="en-IN"/>
           </a:p>
@@ -1403,7 +1409,7 @@
           <a:p>
             <a:fld id="{4896C31C-43B8-41EE-BCE8-B34BD948A31C}" type="datetimeFigureOut">
               <a:rPr lang="en-IN" smtClean="0"/>
-              <a:t>12-05-2022</a:t>
+              <a:t>20-05-2022</a:t>
             </a:fld>
             <a:endParaRPr lang="en-IN"/>
           </a:p>
@@ -1744,7 +1750,7 @@
           <a:p>
             <a:fld id="{4896C31C-43B8-41EE-BCE8-B34BD948A31C}" type="datetimeFigureOut">
               <a:rPr lang="en-IN" smtClean="0"/>
-              <a:t>12-05-2022</a:t>
+              <a:t>20-05-2022</a:t>
             </a:fld>
             <a:endParaRPr lang="en-IN"/>
           </a:p>
@@ -2058,7 +2064,7 @@
           <a:p>
             <a:fld id="{4896C31C-43B8-41EE-BCE8-B34BD948A31C}" type="datetimeFigureOut">
               <a:rPr lang="en-IN" smtClean="0"/>
-              <a:t>12-05-2022</a:t>
+              <a:t>20-05-2022</a:t>
             </a:fld>
             <a:endParaRPr lang="en-IN"/>
           </a:p>
@@ -2451,7 +2457,7 @@
           <a:p>
             <a:fld id="{4896C31C-43B8-41EE-BCE8-B34BD948A31C}" type="datetimeFigureOut">
               <a:rPr lang="en-IN" smtClean="0"/>
-              <a:t>12-05-2022</a:t>
+              <a:t>20-05-2022</a:t>
             </a:fld>
             <a:endParaRPr lang="en-IN"/>
           </a:p>
@@ -2621,7 +2627,7 @@
           <a:p>
             <a:fld id="{4896C31C-43B8-41EE-BCE8-B34BD948A31C}" type="datetimeFigureOut">
               <a:rPr lang="en-IN" smtClean="0"/>
-              <a:t>12-05-2022</a:t>
+              <a:t>20-05-2022</a:t>
             </a:fld>
             <a:endParaRPr lang="en-IN"/>
           </a:p>
@@ -2801,7 +2807,7 @@
           <a:p>
             <a:fld id="{4896C31C-43B8-41EE-BCE8-B34BD948A31C}" type="datetimeFigureOut">
               <a:rPr lang="en-IN" smtClean="0"/>
-              <a:t>12-05-2022</a:t>
+              <a:t>20-05-2022</a:t>
             </a:fld>
             <a:endParaRPr lang="en-IN"/>
           </a:p>
@@ -2977,7 +2983,7 @@
           <a:p>
             <a:fld id="{4896C31C-43B8-41EE-BCE8-B34BD948A31C}" type="datetimeFigureOut">
               <a:rPr lang="en-IN" smtClean="0"/>
-              <a:t>12-05-2022</a:t>
+              <a:t>20-05-2022</a:t>
             </a:fld>
             <a:endParaRPr lang="en-IN"/>
           </a:p>
@@ -3224,7 +3230,7 @@
           <a:p>
             <a:fld id="{4896C31C-43B8-41EE-BCE8-B34BD948A31C}" type="datetimeFigureOut">
               <a:rPr lang="en-IN" smtClean="0"/>
-              <a:t>12-05-2022</a:t>
+              <a:t>20-05-2022</a:t>
             </a:fld>
             <a:endParaRPr lang="en-IN"/>
           </a:p>
@@ -3456,7 +3462,7 @@
           <a:p>
             <a:fld id="{4896C31C-43B8-41EE-BCE8-B34BD948A31C}" type="datetimeFigureOut">
               <a:rPr lang="en-IN" smtClean="0"/>
-              <a:t>12-05-2022</a:t>
+              <a:t>20-05-2022</a:t>
             </a:fld>
             <a:endParaRPr lang="en-IN"/>
           </a:p>
@@ -3830,7 +3836,7 @@
           <a:p>
             <a:fld id="{4896C31C-43B8-41EE-BCE8-B34BD948A31C}" type="datetimeFigureOut">
               <a:rPr lang="en-IN" smtClean="0"/>
-              <a:t>12-05-2022</a:t>
+              <a:t>20-05-2022</a:t>
             </a:fld>
             <a:endParaRPr lang="en-IN"/>
           </a:p>
@@ -3953,7 +3959,7 @@
           <a:p>
             <a:fld id="{4896C31C-43B8-41EE-BCE8-B34BD948A31C}" type="datetimeFigureOut">
               <a:rPr lang="en-IN" smtClean="0"/>
-              <a:t>12-05-2022</a:t>
+              <a:t>20-05-2022</a:t>
             </a:fld>
             <a:endParaRPr lang="en-IN"/>
           </a:p>
@@ -4048,7 +4054,7 @@
           <a:p>
             <a:fld id="{4896C31C-43B8-41EE-BCE8-B34BD948A31C}" type="datetimeFigureOut">
               <a:rPr lang="en-IN" smtClean="0"/>
-              <a:t>12-05-2022</a:t>
+              <a:t>20-05-2022</a:t>
             </a:fld>
             <a:endParaRPr lang="en-IN"/>
           </a:p>
@@ -4303,7 +4309,7 @@
           <a:p>
             <a:fld id="{4896C31C-43B8-41EE-BCE8-B34BD948A31C}" type="datetimeFigureOut">
               <a:rPr lang="en-IN" smtClean="0"/>
-              <a:t>12-05-2022</a:t>
+              <a:t>20-05-2022</a:t>
             </a:fld>
             <a:endParaRPr lang="en-IN"/>
           </a:p>
@@ -4566,7 +4572,7 @@
           <a:p>
             <a:fld id="{4896C31C-43B8-41EE-BCE8-B34BD948A31C}" type="datetimeFigureOut">
               <a:rPr lang="en-IN" smtClean="0"/>
-              <a:t>12-05-2022</a:t>
+              <a:t>20-05-2022</a:t>
             </a:fld>
             <a:endParaRPr lang="en-IN"/>
           </a:p>
@@ -5309,7 +5315,7 @@
           <a:p>
             <a:fld id="{4896C31C-43B8-41EE-BCE8-B34BD948A31C}" type="datetimeFigureOut">
               <a:rPr lang="en-IN" smtClean="0"/>
-              <a:t>12-05-2022</a:t>
+              <a:t>20-05-2022</a:t>
             </a:fld>
             <a:endParaRPr lang="en-IN"/>
           </a:p>
@@ -6083,8 +6089,8 @@
         </p:nvSpPr>
         <p:spPr>
           <a:xfrm>
-            <a:off x="2537138" y="2774152"/>
-            <a:ext cx="4316321" cy="923330"/>
+            <a:off x="3567973" y="2722636"/>
+            <a:ext cx="4334841" cy="923330"/>
           </a:xfrm>
           <a:prstGeom prst="rect">
             <a:avLst/>
@@ -6092,7 +6098,7 @@
           <a:noFill/>
         </p:spPr>
         <p:txBody>
-          <a:bodyPr wrap="square" lIns="91440" tIns="45720" rIns="91440" bIns="45720">
+          <a:bodyPr wrap="none" lIns="91440" tIns="45720" rIns="91440" bIns="45720">
             <a:spAutoFit/>
           </a:bodyPr>
           <a:lstStyle/>
@@ -6112,7 +6118,7 @@
                   </a:outerShdw>
                 </a:effectLst>
               </a:rPr>
-              <a:t>Thank You</a:t>
+              <a:t>Any Queries ?</a:t>
             </a:r>
             <a:endParaRPr lang="en-US" sz="5400" b="0" cap="none" spc="0" dirty="0">
               <a:ln w="0"/>
@@ -6133,7 +6139,92 @@
     </p:spTree>
     <p:extLst>
       <p:ext uri="{BB962C8B-B14F-4D97-AF65-F5344CB8AC3E}">
-        <p14:creationId xmlns:p14="http://schemas.microsoft.com/office/powerpoint/2010/main" val="1834576401"/>
+        <p14:creationId xmlns:p14="http://schemas.microsoft.com/office/powerpoint/2010/main" val="101156637"/>
+      </p:ext>
+    </p:extLst>
+  </p:cSld>
+  <p:clrMapOvr>
+    <a:masterClrMapping/>
+  </p:clrMapOvr>
+</p:sld>
+</file>
+
+<file path=ppt/slides/slide11.xml><?xml version="1.0" encoding="utf-8"?>
+<p:sld xmlns:a="http://schemas.openxmlformats.org/drawingml/2006/main" xmlns:r="http://schemas.openxmlformats.org/officeDocument/2006/relationships" xmlns:p="http://schemas.openxmlformats.org/presentationml/2006/main">
+  <p:cSld>
+    <p:spTree>
+      <p:nvGrpSpPr>
+        <p:cNvPr id="1" name=""/>
+        <p:cNvGrpSpPr/>
+        <p:nvPr/>
+      </p:nvGrpSpPr>
+      <p:grpSpPr>
+        <a:xfrm>
+          <a:off x="0" y="0"/>
+          <a:ext cx="0" cy="0"/>
+          <a:chOff x="0" y="0"/>
+          <a:chExt cx="0" cy="0"/>
+        </a:xfrm>
+      </p:grpSpPr>
+      <p:sp>
+        <p:nvSpPr>
+          <p:cNvPr id="2" name="Rectangle 1"/>
+          <p:cNvSpPr/>
+          <p:nvPr/>
+        </p:nvSpPr>
+        <p:spPr>
+          <a:xfrm>
+            <a:off x="2537138" y="2774152"/>
+            <a:ext cx="4316321" cy="923330"/>
+          </a:xfrm>
+          <a:prstGeom prst="rect">
+            <a:avLst/>
+          </a:prstGeom>
+          <a:noFill/>
+        </p:spPr>
+        <p:txBody>
+          <a:bodyPr wrap="square" lIns="91440" tIns="45720" rIns="91440" bIns="45720">
+            <a:spAutoFit/>
+          </a:bodyPr>
+          <a:lstStyle/>
+          <a:p>
+            <a:pPr algn="ctr"/>
+            <a:r>
+              <a:rPr lang="en-US" sz="5400" b="0" cap="none" spc="0" dirty="0" smtClean="0">
+                <a:ln w="0"/>
+                <a:solidFill>
+                  <a:schemeClr val="accent1"/>
+                </a:solidFill>
+                <a:effectLst>
+                  <a:outerShdw blurRad="38100" dist="25400" dir="5400000" algn="ctr" rotWithShape="0">
+                    <a:srgbClr val="6E747A">
+                      <a:alpha val="43000"/>
+                    </a:srgbClr>
+                  </a:outerShdw>
+                </a:effectLst>
+              </a:rPr>
+              <a:t>Thank You</a:t>
+            </a:r>
+            <a:endParaRPr lang="en-US" sz="5400" b="0" cap="none" spc="0" dirty="0">
+              <a:ln w="0"/>
+              <a:solidFill>
+                <a:schemeClr val="accent1"/>
+              </a:solidFill>
+              <a:effectLst>
+                <a:outerShdw blurRad="38100" dist="25400" dir="5400000" algn="ctr" rotWithShape="0">
+                  <a:srgbClr val="6E747A">
+                    <a:alpha val="43000"/>
+                  </a:srgbClr>
+                </a:outerShdw>
+              </a:effectLst>
+            </a:endParaRPr>
+          </a:p>
+        </p:txBody>
+      </p:sp>
+    </p:spTree>
+    <p:extLst>
+      <p:ext uri="{BB962C8B-B14F-4D97-AF65-F5344CB8AC3E}">
+        <p14:creationId xmlns:p14="http://schemas.microsoft.com/office/powerpoint/2010/main" val="3934341469"/>
       </p:ext>
     </p:extLst>
   </p:cSld>
@@ -6213,6 +6304,12 @@
           <a:p>
             <a:r>
               <a:rPr lang="en-US" dirty="0" smtClean="0"/>
+              <a:t>Technologies Used</a:t>
+            </a:r>
+          </a:p>
+          <a:p>
+            <a:r>
+              <a:rPr lang="en-US" dirty="0" smtClean="0"/>
               <a:t>Benefits</a:t>
             </a:r>
           </a:p>
@@ -6225,7 +6322,7 @@
           <a:p>
             <a:r>
               <a:rPr lang="en-US" dirty="0" smtClean="0"/>
-              <a:t>User Roles</a:t>
+              <a:t>User Role</a:t>
             </a:r>
           </a:p>
           <a:p>
@@ -6405,7 +6502,7 @@
           <a:p>
             <a:r>
               <a:rPr lang="en-US" dirty="0" smtClean="0"/>
-              <a:t>Benefits</a:t>
+              <a:t>Technologies Used</a:t>
             </a:r>
             <a:endParaRPr lang="en-IN" dirty="0"/>
           </a:p>
@@ -6428,14 +6525,29 @@
           <a:p>
             <a:r>
               <a:rPr lang="en-US" dirty="0" smtClean="0"/>
-              <a:t>The pharmacy information system (PIS) is a multi-functional system that allows pharmacists to maintain the supply and organization of drugs. </a:t>
+              <a:t>Angular 8</a:t>
             </a:r>
           </a:p>
           <a:p>
             <a:r>
               <a:rPr lang="en-US" dirty="0" smtClean="0"/>
-              <a:t>The system helps decrease medication errors, increase patient safety, report drug usage, and track costs.</a:t>
-            </a:r>
+              <a:t>Spring boot </a:t>
+            </a:r>
+            <a:r>
+              <a:rPr lang="en-US" dirty="0" smtClean="0"/>
+              <a:t>with data JPA</a:t>
+            </a:r>
+          </a:p>
+          <a:p>
+            <a:r>
+              <a:rPr lang="en-US" dirty="0" smtClean="0"/>
+              <a:t>Oracle 11g database</a:t>
+            </a:r>
+          </a:p>
+          <a:p>
+            <a:pPr marL="0" indent="0">
+              <a:buNone/>
+            </a:pPr>
             <a:endParaRPr lang="en-IN" dirty="0"/>
           </a:p>
         </p:txBody>
@@ -6443,20 +6555,13 @@
     </p:spTree>
     <p:extLst>
       <p:ext uri="{BB962C8B-B14F-4D97-AF65-F5344CB8AC3E}">
-        <p14:creationId xmlns:p14="http://schemas.microsoft.com/office/powerpoint/2010/main" val="2819269999"/>
+        <p14:creationId xmlns:p14="http://schemas.microsoft.com/office/powerpoint/2010/main" val="1715736058"/>
       </p:ext>
     </p:extLst>
   </p:cSld>
   <p:clrMapOvr>
     <a:masterClrMapping/>
   </p:clrMapOvr>
-  <p:timing>
-    <p:tnLst>
-      <p:par>
-        <p:cTn id="1" dur="indefinite" restart="never" nodeType="tmRoot"/>
-      </p:par>
-    </p:tnLst>
-  </p:timing>
 </p:sld>
 </file>
 
@@ -6493,8 +6598,8 @@
           <a:lstStyle/>
           <a:p>
             <a:r>
-              <a:rPr lang="en-US" dirty="0" err="1" smtClean="0"/>
-              <a:t>Funtions</a:t>
+              <a:rPr lang="en-US" dirty="0" smtClean="0"/>
+              <a:t>Benefits</a:t>
             </a:r>
             <a:endParaRPr lang="en-IN" dirty="0"/>
           </a:p>
@@ -6517,27 +6622,44 @@
           <a:p>
             <a:r>
               <a:rPr lang="en-US" dirty="0" smtClean="0"/>
-              <a:t>It stores product information and customer information.</a:t>
+              <a:t>The pharmacy information system (PIS) is a multi-functional system that allows pharmacists to maintain the supply and organization of drugs. </a:t>
             </a:r>
           </a:p>
           <a:p>
             <a:r>
               <a:rPr lang="en-US" dirty="0" smtClean="0"/>
-              <a:t>We can view medicines by category.</a:t>
-            </a:r>
-          </a:p>
-          <a:p>
+              <a:t>The system helps decrease medication errors, increase patient safety, report drug usage, and track costs</a:t>
+            </a:r>
             <a:r>
               <a:rPr lang="en-US" dirty="0" smtClean="0"/>
-              <a:t>Adding products to cart.</a:t>
-            </a:r>
+              <a:t>.</a:t>
+            </a:r>
+          </a:p>
+          <a:p>
+            <a:r>
+              <a:rPr lang="en-US" dirty="0" smtClean="0"/>
+              <a:t>Cheaper</a:t>
+            </a:r>
+          </a:p>
+          <a:p>
+            <a:r>
+              <a:rPr lang="en-US" dirty="0" smtClean="0"/>
+              <a:t>Discreet</a:t>
+            </a:r>
+          </a:p>
+          <a:p>
+            <a:r>
+              <a:rPr lang="en-US" dirty="0" smtClean="0"/>
+              <a:t>Easy to get Refills</a:t>
+            </a:r>
+            <a:endParaRPr lang="en-IN" dirty="0"/>
           </a:p>
         </p:txBody>
       </p:sp>
     </p:spTree>
     <p:extLst>
       <p:ext uri="{BB962C8B-B14F-4D97-AF65-F5344CB8AC3E}">
-        <p14:creationId xmlns:p14="http://schemas.microsoft.com/office/powerpoint/2010/main" val="1309384573"/>
+        <p14:creationId xmlns:p14="http://schemas.microsoft.com/office/powerpoint/2010/main" val="2819269999"/>
       </p:ext>
     </p:extLst>
   </p:cSld>
@@ -6588,7 +6710,7 @@
           <a:p>
             <a:r>
               <a:rPr lang="en-US" dirty="0" smtClean="0"/>
-              <a:t>User Roles</a:t>
+              <a:t>Functions</a:t>
             </a:r>
             <a:endParaRPr lang="en-IN" dirty="0"/>
           </a:p>
@@ -6611,68 +6733,21 @@
           <a:p>
             <a:r>
               <a:rPr lang="en-US" dirty="0" smtClean="0"/>
-              <a:t>Admin </a:t>
-            </a:r>
-            <a:endParaRPr lang="en-IN" dirty="0"/>
-          </a:p>
-          <a:p>
-            <a:pPr marL="0" indent="0">
-              <a:buNone/>
-            </a:pPr>
+              <a:t>It stores product information and customer information.</a:t>
+            </a:r>
+          </a:p>
+          <a:p>
             <a:r>
               <a:rPr lang="en-US" dirty="0" smtClean="0"/>
-              <a:t>     </a:t>
-            </a:r>
-            <a:r>
-              <a:rPr lang="en-US" dirty="0"/>
-              <a:t>Admin create </a:t>
-            </a:r>
-            <a:r>
-              <a:rPr lang="en-US" dirty="0" smtClean="0"/>
-              <a:t>category, </a:t>
-            </a:r>
-            <a:r>
-              <a:rPr lang="en-US" dirty="0"/>
-              <a:t>delete </a:t>
-            </a:r>
-            <a:r>
-              <a:rPr lang="en-US" dirty="0" smtClean="0"/>
-              <a:t>category, add products, update products and delete products. </a:t>
-            </a:r>
-            <a:endParaRPr lang="en-IN" dirty="0"/>
-          </a:p>
-          <a:p>
-            <a:pPr marL="0" indent="0">
-              <a:buNone/>
-            </a:pPr>
-            <a:endParaRPr lang="en-US" dirty="0" smtClean="0"/>
-          </a:p>
-          <a:p>
-            <a:r>
-              <a:rPr lang="en-US" dirty="0" smtClean="0"/>
-              <a:t>User</a:t>
-            </a:r>
-          </a:p>
-          <a:p>
-            <a:pPr marL="0" indent="0">
-              <a:buNone/>
-            </a:pPr>
-            <a:r>
-              <a:rPr lang="en-US" dirty="0"/>
-              <a:t> </a:t>
-            </a:r>
-            <a:r>
-              <a:rPr lang="en-US" dirty="0" smtClean="0"/>
-              <a:t>   User view products and add products to cart.</a:t>
-            </a:r>
-            <a:endParaRPr lang="en-IN" dirty="0"/>
+              <a:t>We can view medicines by category.</a:t>
+            </a:r>
           </a:p>
         </p:txBody>
       </p:sp>
     </p:spTree>
     <p:extLst>
       <p:ext uri="{BB962C8B-B14F-4D97-AF65-F5344CB8AC3E}">
-        <p14:creationId xmlns:p14="http://schemas.microsoft.com/office/powerpoint/2010/main" val="3630245257"/>
+        <p14:creationId xmlns:p14="http://schemas.microsoft.com/office/powerpoint/2010/main" val="1309384573"/>
       </p:ext>
     </p:extLst>
   </p:cSld>
@@ -6723,7 +6798,7 @@
           <a:p>
             <a:r>
               <a:rPr lang="en-US" dirty="0" smtClean="0"/>
-              <a:t>Goals and Objectives</a:t>
+              <a:t>User Role</a:t>
             </a:r>
             <a:endParaRPr lang="en-IN" dirty="0"/>
           </a:p>
@@ -6744,82 +6819,99 @@
           <a:bodyPr/>
           <a:lstStyle/>
           <a:p>
-            <a:pPr lvl="0"/>
-            <a:r>
-              <a:rPr lang="en-US" dirty="0"/>
-              <a:t>The Project involves building a website for an online </a:t>
-            </a:r>
             <a:r>
               <a:rPr lang="en-US" dirty="0" smtClean="0"/>
-              <a:t>pharmacy </a:t>
-            </a:r>
-            <a:r>
-              <a:rPr lang="en-US" dirty="0"/>
-              <a:t>management </a:t>
-            </a:r>
+              <a:t>Admin </a:t>
+            </a:r>
+            <a:endParaRPr lang="en-IN" dirty="0"/>
+          </a:p>
+          <a:p>
+            <a:pPr>
+              <a:buFont typeface="Wingdings" panose="05000000000000000000" pitchFamily="2" charset="2"/>
+              <a:buChar char="§"/>
+            </a:pPr>
             <a:r>
               <a:rPr lang="en-US" dirty="0" smtClean="0"/>
-              <a:t>system(OPMS).</a:t>
-            </a:r>
-            <a:endParaRPr lang="en-IN" dirty="0"/>
-          </a:p>
-          <a:p>
-            <a:pPr lvl="0"/>
+              <a:t>View Category</a:t>
+            </a:r>
+          </a:p>
+          <a:p>
+            <a:pPr>
+              <a:buFont typeface="Wingdings" panose="05000000000000000000" pitchFamily="2" charset="2"/>
+              <a:buChar char="§"/>
+            </a:pPr>
             <a:r>
               <a:rPr lang="en-US" dirty="0" smtClean="0"/>
-              <a:t>OPMS is </a:t>
-            </a:r>
-            <a:r>
-              <a:rPr lang="en-US" dirty="0"/>
-              <a:t>a web-based online </a:t>
-            </a:r>
+              <a:t>Add Category</a:t>
+            </a:r>
+          </a:p>
+          <a:p>
+            <a:pPr>
+              <a:buFont typeface="Wingdings" panose="05000000000000000000" pitchFamily="2" charset="2"/>
+              <a:buChar char="§"/>
+            </a:pPr>
             <a:r>
               <a:rPr lang="en-US" dirty="0" smtClean="0"/>
-              <a:t>shopping site that allows</a:t>
-            </a:r>
-            <a:r>
-              <a:rPr lang="en-IN" dirty="0" smtClean="0"/>
-              <a:t> </a:t>
-            </a:r>
+              <a:t>Update Category</a:t>
+            </a:r>
+            <a:endParaRPr lang="en-US" dirty="0"/>
+          </a:p>
+          <a:p>
+            <a:pPr>
+              <a:buFont typeface="Wingdings" panose="05000000000000000000" pitchFamily="2" charset="2"/>
+              <a:buChar char="§"/>
+            </a:pPr>
             <a:r>
               <a:rPr lang="en-US" dirty="0" smtClean="0"/>
-              <a:t>users to </a:t>
-            </a:r>
-            <a:r>
-              <a:rPr lang="en-US" dirty="0"/>
-              <a:t>know their </a:t>
-            </a:r>
+              <a:t>Delete Category</a:t>
+            </a:r>
+          </a:p>
+          <a:p>
+            <a:pPr>
+              <a:buFont typeface="Wingdings" panose="05000000000000000000" pitchFamily="2" charset="2"/>
+              <a:buChar char="§"/>
+            </a:pPr>
             <a:r>
               <a:rPr lang="en-US" dirty="0" smtClean="0"/>
-              <a:t>updates</a:t>
-            </a:r>
-            <a:r>
-              <a:rPr lang="en-US" dirty="0"/>
-              <a:t> </a:t>
-            </a:r>
+              <a:t>View Medicines</a:t>
+            </a:r>
+          </a:p>
+          <a:p>
+            <a:pPr>
+              <a:buFont typeface="Wingdings" panose="05000000000000000000" pitchFamily="2" charset="2"/>
+              <a:buChar char="§"/>
+            </a:pPr>
             <a:r>
               <a:rPr lang="en-US" dirty="0" smtClean="0"/>
-              <a:t>on their products.</a:t>
-            </a:r>
-            <a:endParaRPr lang="en-IN" dirty="0"/>
-          </a:p>
-          <a:p>
-            <a:pPr lvl="0"/>
-            <a:r>
-              <a:rPr lang="en-US" dirty="0"/>
-              <a:t>Easy to access the system anywhere and anytime.</a:t>
-            </a:r>
-            <a:endParaRPr lang="en-IN" dirty="0"/>
-          </a:p>
-          <a:p>
-            <a:endParaRPr lang="en-IN" dirty="0"/>
+              <a:t>Add Medicines</a:t>
+            </a:r>
+          </a:p>
+          <a:p>
+            <a:pPr>
+              <a:buFont typeface="Wingdings" panose="05000000000000000000" pitchFamily="2" charset="2"/>
+              <a:buChar char="§"/>
+            </a:pPr>
+            <a:r>
+              <a:rPr lang="en-US" dirty="0" smtClean="0"/>
+              <a:t>Update Medicines</a:t>
+            </a:r>
+          </a:p>
+          <a:p>
+            <a:pPr>
+              <a:buFont typeface="Wingdings" panose="05000000000000000000" pitchFamily="2" charset="2"/>
+              <a:buChar char="§"/>
+            </a:pPr>
+            <a:r>
+              <a:rPr lang="en-US" dirty="0" smtClean="0"/>
+              <a:t>Delete Medicines</a:t>
+            </a:r>
           </a:p>
         </p:txBody>
       </p:sp>
     </p:spTree>
     <p:extLst>
       <p:ext uri="{BB962C8B-B14F-4D97-AF65-F5344CB8AC3E}">
-        <p14:creationId xmlns:p14="http://schemas.microsoft.com/office/powerpoint/2010/main" val="3556568802"/>
+        <p14:creationId xmlns:p14="http://schemas.microsoft.com/office/powerpoint/2010/main" val="3630245257"/>
       </p:ext>
     </p:extLst>
   </p:cSld>
@@ -6869,14 +6961,10 @@
           <a:lstStyle/>
           <a:p>
             <a:r>
-              <a:rPr lang="en-US" dirty="0" smtClean="0">
-                <a:cs typeface="Times New Roman" panose="02020603050405020304" pitchFamily="18" charset="0"/>
-              </a:rPr>
-              <a:t>Future Enhancement</a:t>
-            </a:r>
-            <a:endParaRPr lang="en-IN" dirty="0">
-              <a:cs typeface="Times New Roman" panose="02020603050405020304" pitchFamily="18" charset="0"/>
-            </a:endParaRPr>
+              <a:rPr lang="en-US" dirty="0" smtClean="0"/>
+              <a:t>Goals and Objectives</a:t>
+            </a:r>
+            <a:endParaRPr lang="en-IN" dirty="0"/>
           </a:p>
         </p:txBody>
       </p:sp>
@@ -6895,49 +6983,82 @@
           <a:bodyPr/>
           <a:lstStyle/>
           <a:p>
-            <a:r>
-              <a:rPr lang="en-US" dirty="0">
-                <a:latin typeface="+mj-lt"/>
-                <a:cs typeface="Times New Roman" panose="02020603050405020304" pitchFamily="18" charset="0"/>
-              </a:rPr>
-              <a:t>Online p</a:t>
-            </a:r>
-            <a:r>
-              <a:rPr lang="en-US" dirty="0" smtClean="0">
-                <a:latin typeface="+mj-lt"/>
-                <a:cs typeface="Times New Roman" panose="02020603050405020304" pitchFamily="18" charset="0"/>
-              </a:rPr>
-              <a:t>ayments.</a:t>
-            </a:r>
-          </a:p>
-          <a:p>
-            <a:r>
-              <a:rPr lang="en-US" dirty="0" smtClean="0">
-                <a:latin typeface="+mj-lt"/>
-                <a:cs typeface="Times New Roman" panose="02020603050405020304" pitchFamily="18" charset="0"/>
-              </a:rPr>
-              <a:t>Online consultation with doctors.</a:t>
-            </a:r>
-            <a:endParaRPr lang="en-IN" dirty="0">
-              <a:latin typeface="+mj-lt"/>
-              <a:cs typeface="Times New Roman" panose="02020603050405020304" pitchFamily="18" charset="0"/>
-            </a:endParaRPr>
-          </a:p>
-          <a:p>
-            <a:r>
-              <a:rPr lang="en-US" dirty="0" smtClean="0">
-                <a:latin typeface="+mj-lt"/>
-                <a:cs typeface="Times New Roman" panose="02020603050405020304" pitchFamily="18" charset="0"/>
-              </a:rPr>
-              <a:t>Provide user feedback and reviews.</a:t>
-            </a:r>
+            <a:pPr lvl="0"/>
+            <a:r>
+              <a:rPr lang="en-US" dirty="0"/>
+              <a:t>The Project involves building a website for an online </a:t>
+            </a:r>
+            <a:r>
+              <a:rPr lang="en-US" dirty="0" smtClean="0"/>
+              <a:t>pharmacy </a:t>
+            </a:r>
+            <a:r>
+              <a:rPr lang="en-US" dirty="0"/>
+              <a:t>management </a:t>
+            </a:r>
+            <a:r>
+              <a:rPr lang="en-US" dirty="0" smtClean="0"/>
+              <a:t>system(OPMS).</a:t>
+            </a:r>
+            <a:endParaRPr lang="en-IN" dirty="0"/>
+          </a:p>
+          <a:p>
+            <a:pPr lvl="0"/>
+            <a:r>
+              <a:rPr lang="en-US" dirty="0" smtClean="0"/>
+              <a:t>OPMS is </a:t>
+            </a:r>
+            <a:r>
+              <a:rPr lang="en-US" dirty="0"/>
+              <a:t>a web-based online </a:t>
+            </a:r>
+            <a:r>
+              <a:rPr lang="en-US" dirty="0" smtClean="0"/>
+              <a:t>shopping site that allows</a:t>
+            </a:r>
+            <a:r>
+              <a:rPr lang="en-IN" dirty="0" smtClean="0"/>
+              <a:t> </a:t>
+            </a:r>
+            <a:r>
+              <a:rPr lang="en-US" dirty="0" smtClean="0"/>
+              <a:t>users to </a:t>
+            </a:r>
+            <a:r>
+              <a:rPr lang="en-US" dirty="0"/>
+              <a:t>know their </a:t>
+            </a:r>
+            <a:r>
+              <a:rPr lang="en-US" dirty="0" smtClean="0"/>
+              <a:t>updates</a:t>
+            </a:r>
+            <a:r>
+              <a:rPr lang="en-US" dirty="0"/>
+              <a:t> </a:t>
+            </a:r>
+            <a:r>
+              <a:rPr lang="en-US" dirty="0" smtClean="0"/>
+              <a:t>on their products.</a:t>
+            </a:r>
+            <a:endParaRPr lang="en-IN" dirty="0"/>
+          </a:p>
+          <a:p>
+            <a:pPr lvl="0"/>
+            <a:r>
+              <a:rPr lang="en-US" dirty="0"/>
+              <a:t>Easy to access the system anywhere and anytime.</a:t>
+            </a:r>
+            <a:endParaRPr lang="en-IN" dirty="0"/>
+          </a:p>
+          <a:p>
+            <a:endParaRPr lang="en-IN" dirty="0"/>
           </a:p>
         </p:txBody>
       </p:sp>
     </p:spTree>
     <p:extLst>
       <p:ext uri="{BB962C8B-B14F-4D97-AF65-F5344CB8AC3E}">
-        <p14:creationId xmlns:p14="http://schemas.microsoft.com/office/powerpoint/2010/main" val="3953988871"/>
+        <p14:creationId xmlns:p14="http://schemas.microsoft.com/office/powerpoint/2010/main" val="3556568802"/>
       </p:ext>
     </p:extLst>
   </p:cSld>
@@ -6973,63 +7094,89 @@
       </p:grpSpPr>
       <p:sp>
         <p:nvSpPr>
-          <p:cNvPr id="2" name="Rectangle 1"/>
-          <p:cNvSpPr/>
-          <p:nvPr/>
-        </p:nvSpPr>
-        <p:spPr>
-          <a:xfrm>
-            <a:off x="2537138" y="2774152"/>
-            <a:ext cx="4316321" cy="1754326"/>
-          </a:xfrm>
-          <a:prstGeom prst="rect">
-            <a:avLst/>
-          </a:prstGeom>
-          <a:noFill/>
-        </p:spPr>
-        <p:txBody>
-          <a:bodyPr wrap="square" lIns="91440" tIns="45720" rIns="91440" bIns="45720">
-            <a:spAutoFit/>
-          </a:bodyPr>
-          <a:lstStyle/>
-          <a:p>
-            <a:pPr algn="ctr"/>
-            <a:r>
-              <a:rPr lang="en-US" sz="5400" b="0" cap="none" spc="0" dirty="0" smtClean="0">
-                <a:ln w="0"/>
-                <a:solidFill>
-                  <a:schemeClr val="accent1"/>
-                </a:solidFill>
-                <a:effectLst>
-                  <a:outerShdw blurRad="38100" dist="25400" dir="5400000" algn="ctr" rotWithShape="0">
-                    <a:srgbClr val="6E747A">
-                      <a:alpha val="43000"/>
-                    </a:srgbClr>
-                  </a:outerShdw>
-                </a:effectLst>
+          <p:cNvPr id="2" name="Title 1"/>
+          <p:cNvSpPr>
+            <a:spLocks noGrp="1"/>
+          </p:cNvSpPr>
+          <p:nvPr>
+            <p:ph type="title"/>
+          </p:nvPr>
+        </p:nvSpPr>
+        <p:spPr/>
+        <p:txBody>
+          <a:bodyPr/>
+          <a:lstStyle/>
+          <a:p>
+            <a:r>
+              <a:rPr lang="en-US" dirty="0" smtClean="0">
+                <a:cs typeface="Times New Roman" panose="02020603050405020304" pitchFamily="18" charset="0"/>
               </a:rPr>
-              <a:t>Any Questions?</a:t>
-            </a:r>
-            <a:endParaRPr lang="en-US" sz="5400" b="0" cap="none" spc="0" dirty="0">
-              <a:ln w="0"/>
-              <a:solidFill>
-                <a:schemeClr val="accent1"/>
-              </a:solidFill>
-              <a:effectLst>
-                <a:outerShdw blurRad="38100" dist="25400" dir="5400000" algn="ctr" rotWithShape="0">
-                  <a:srgbClr val="6E747A">
-                    <a:alpha val="43000"/>
-                  </a:srgbClr>
-                </a:outerShdw>
-              </a:effectLst>
+              <a:t>Future Enhancement</a:t>
+            </a:r>
+            <a:endParaRPr lang="en-IN" dirty="0">
+              <a:cs typeface="Times New Roman" panose="02020603050405020304" pitchFamily="18" charset="0"/>
             </a:endParaRPr>
+          </a:p>
+        </p:txBody>
+      </p:sp>
+      <p:sp>
+        <p:nvSpPr>
+          <p:cNvPr id="3" name="Content Placeholder 2"/>
+          <p:cNvSpPr>
+            <a:spLocks noGrp="1"/>
+          </p:cNvSpPr>
+          <p:nvPr>
+            <p:ph idx="1"/>
+          </p:nvPr>
+        </p:nvSpPr>
+        <p:spPr/>
+        <p:txBody>
+          <a:bodyPr/>
+          <a:lstStyle/>
+          <a:p>
+            <a:r>
+              <a:rPr lang="en-US" dirty="0">
+                <a:latin typeface="+mj-lt"/>
+                <a:cs typeface="Times New Roman" panose="02020603050405020304" pitchFamily="18" charset="0"/>
+              </a:rPr>
+              <a:t>Online p</a:t>
+            </a:r>
+            <a:r>
+              <a:rPr lang="en-US" dirty="0" smtClean="0">
+                <a:latin typeface="+mj-lt"/>
+                <a:cs typeface="Times New Roman" panose="02020603050405020304" pitchFamily="18" charset="0"/>
+              </a:rPr>
+              <a:t>ayments.</a:t>
+            </a:r>
+          </a:p>
+          <a:p>
+            <a:r>
+              <a:rPr lang="en-US" dirty="0" smtClean="0">
+                <a:latin typeface="+mj-lt"/>
+                <a:cs typeface="Times New Roman" panose="02020603050405020304" pitchFamily="18" charset="0"/>
+              </a:rPr>
+              <a:t>Online consultation with doctors.</a:t>
+            </a:r>
+            <a:endParaRPr lang="en-IN" dirty="0">
+              <a:latin typeface="+mj-lt"/>
+              <a:cs typeface="Times New Roman" panose="02020603050405020304" pitchFamily="18" charset="0"/>
+            </a:endParaRPr>
+          </a:p>
+          <a:p>
+            <a:r>
+              <a:rPr lang="en-US" dirty="0" smtClean="0">
+                <a:latin typeface="+mj-lt"/>
+                <a:cs typeface="Times New Roman" panose="02020603050405020304" pitchFamily="18" charset="0"/>
+              </a:rPr>
+              <a:t>Provide user feedback and reviews.</a:t>
+            </a:r>
           </a:p>
         </p:txBody>
       </p:sp>
     </p:spTree>
     <p:extLst>
       <p:ext uri="{BB962C8B-B14F-4D97-AF65-F5344CB8AC3E}">
-        <p14:creationId xmlns:p14="http://schemas.microsoft.com/office/powerpoint/2010/main" val="3934341469"/>
+        <p14:creationId xmlns:p14="http://schemas.microsoft.com/office/powerpoint/2010/main" val="3953988871"/>
       </p:ext>
     </p:extLst>
   </p:cSld>

</xml_diff>